<commit_message>
j'en ait marre de donner un nom a mes commit
</commit_message>
<xml_diff>
--- a/doc/présentation_projet_LO21.pptx
+++ b/doc/présentation_projet_LO21.pptx
@@ -7233,10 +7233,10 @@
       </p:sp>
       <p:pic>
         <p:nvPicPr>
-          <p:cNvPr id="3" name="Image 2">
+          <p:cNvPr id="2" name="Image 1">
             <a:extLst>
               <a:ext uri="{FF2B5EF4-FFF2-40B4-BE49-F238E27FC236}">
-                <a16:creationId xmlns:a16="http://schemas.microsoft.com/office/drawing/2014/main" id="{68C3C9C2-0DFD-4520-B8E9-B4F8E23911FF}"/>
+                <a16:creationId xmlns:a16="http://schemas.microsoft.com/office/drawing/2014/main" id="{04F201C0-F9E4-4606-A576-B69D97E4880E}"/>
               </a:ext>
             </a:extLst>
           </p:cNvPr>
@@ -7253,7 +7253,7 @@
         </p:blipFill>
         <p:spPr>
           <a:xfrm>
-            <a:off x="1907684" y="906963"/>
+            <a:off x="1907684" y="866829"/>
             <a:ext cx="8376630" cy="5809992"/>
           </a:xfrm>
           <a:prstGeom prst="rect">
@@ -7771,10 +7771,10 @@
       </p:sp>
       <p:pic>
         <p:nvPicPr>
-          <p:cNvPr id="5" name="Image 4">
+          <p:cNvPr id="6" name="Image 5">
             <a:extLst>
               <a:ext uri="{FF2B5EF4-FFF2-40B4-BE49-F238E27FC236}">
-                <a16:creationId xmlns:a16="http://schemas.microsoft.com/office/drawing/2014/main" id="{5E03BEC7-D55F-4D49-B644-12F7CB902830}"/>
+                <a16:creationId xmlns:a16="http://schemas.microsoft.com/office/drawing/2014/main" id="{B107A744-BFFC-4DA0-AFA6-6E9118045B5F}"/>
               </a:ext>
             </a:extLst>
           </p:cNvPr>
@@ -7783,44 +7783,32 @@
           </p:cNvPicPr>
           <p:nvPr/>
         </p:nvPicPr>
-        <p:blipFill>
+        <p:blipFill rotWithShape="1">
           <a:blip r:embed="rId3"/>
-          <a:stretch>
-            <a:fillRect/>
-          </a:stretch>
+          <a:srcRect/>
+          <a:stretch/>
         </p:blipFill>
         <p:spPr>
           <a:xfrm>
-            <a:off x="757237" y="815876"/>
-            <a:ext cx="10540230" cy="5471657"/>
+            <a:off x="2647718" y="1379626"/>
+            <a:ext cx="6896561" cy="4995012"/>
           </a:xfrm>
-          <a:prstGeom prst="roundRect">
-            <a:avLst>
-              <a:gd name="adj" fmla="val 5383"/>
-            </a:avLst>
+          <a:prstGeom prst="rect">
+            <a:avLst/>
           </a:prstGeom>
-          <a:ln>
-            <a:noFill/>
+          <a:ln w="127000" cap="sq">
+            <a:solidFill>
+              <a:srgbClr val="000000"/>
+            </a:solidFill>
+            <a:miter lim="800000"/>
           </a:ln>
           <a:effectLst>
-            <a:outerShdw blurRad="152400" dist="12000" dir="900000" sy="98000" kx="110000" ky="200000" algn="tl" rotWithShape="0">
+            <a:outerShdw blurRad="57150" dist="50800" dir="2700000" algn="tl" rotWithShape="0">
               <a:srgbClr val="000000">
-                <a:alpha val="30000"/>
+                <a:alpha val="40000"/>
               </a:srgbClr>
             </a:outerShdw>
           </a:effectLst>
-          <a:scene3d>
-            <a:camera prst="perspectiveRelaxed">
-              <a:rot lat="19800000" lon="1200000" rev="20820000"/>
-            </a:camera>
-            <a:lightRig rig="threePt" dir="t"/>
-          </a:scene3d>
-          <a:sp3d contourW="6350" prstMaterial="matte">
-            <a:bevelT w="101600" h="101600"/>
-            <a:contourClr>
-              <a:srgbClr val="969696"/>
-            </a:contourClr>
-          </a:sp3d>
         </p:spPr>
       </p:pic>
     </p:spTree>
@@ -8852,7 +8840,7 @@
               <a:rPr lang="fr-FR" sz="10000" b="1" i="0" dirty="0">
                 <a:latin typeface="Rockwell" panose="02060603020205020403" pitchFamily="18" charset="0"/>
               </a:rPr>
-              <a:t>Merci de nous avoir ecoute </a:t>
+              <a:t>Merci de nous avoir écouté </a:t>
             </a:r>
           </a:p>
         </p:txBody>

</xml_diff>

<commit_message>
insh c'est le dernier
</commit_message>
<xml_diff>
--- a/doc/présentation_projet_LO21.pptx
+++ b/doc/présentation_projet_LO21.pptx
@@ -8399,31 +8399,8 @@
                 </a:effectLst>
                 <a:latin typeface="Rockwell" panose="02060603020205020403" pitchFamily="18" charset="0"/>
               </a:rPr>
-              <a:t>-Expérience </a:t>
-            </a:r>
-            <a:r>
-              <a:rPr lang="fr-FR" sz="2800" b="1" dirty="0" err="1">
-                <a:effectLst>
-                  <a:outerShdw blurRad="38100" dist="38100" dir="2700000" algn="tl">
-                    <a:srgbClr val="000000">
-                      <a:alpha val="43137"/>
-                    </a:srgbClr>
-                  </a:outerShdw>
-                </a:effectLst>
-                <a:latin typeface="Rockwell" panose="02060603020205020403" pitchFamily="18" charset="0"/>
-              </a:rPr>
-              <a:t>aquise</a:t>
-            </a:r>
-            <a:endParaRPr lang="fr-FR" sz="2800" b="1" dirty="0">
-              <a:effectLst>
-                <a:outerShdw blurRad="38100" dist="38100" dir="2700000" algn="tl">
-                  <a:srgbClr val="000000">
-                    <a:alpha val="43137"/>
-                  </a:srgbClr>
-                </a:outerShdw>
-              </a:effectLst>
-              <a:latin typeface="Rockwell" panose="02060603020205020403" pitchFamily="18" charset="0"/>
-            </a:endParaRPr>
+              <a:t>-Expérience acquise</a:t>
+            </a:r>
           </a:p>
         </p:txBody>
       </p:sp>

</xml_diff>